<commit_message>
Adding comments provided by Prof. Carlos M Fonseca after the presentation
</commit_message>
<xml_diff>
--- a/presentation_team_2024.pptx
+++ b/presentation_team_2024.pptx
@@ -5,7 +5,7 @@
     <p:sldMasterId id="2147483659" r:id="rId1"/>
   </p:sldMasterIdLst>
   <p:notesMasterIdLst>
-    <p:notesMasterId r:id="rId14"/>
+    <p:notesMasterId r:id="rId15"/>
   </p:notesMasterIdLst>
   <p:sldIdLst>
     <p:sldId id="256" r:id="rId2"/>
@@ -20,23 +20,24 @@
     <p:sldId id="267" r:id="rId11"/>
     <p:sldId id="268" r:id="rId12"/>
     <p:sldId id="262" r:id="rId13"/>
+    <p:sldId id="269" r:id="rId14"/>
   </p:sldIdLst>
   <p:sldSz cx="9144000" cy="5143500" type="screen16x9"/>
   <p:notesSz cx="6858000" cy="9144000"/>
   <p:embeddedFontLst>
     <p:embeddedFont>
       <p:font typeface="Lato" panose="020B0604020202020204" charset="0"/>
-      <p:regular r:id="rId15"/>
-      <p:bold r:id="rId16"/>
-      <p:italic r:id="rId17"/>
-      <p:boldItalic r:id="rId18"/>
+      <p:regular r:id="rId16"/>
+      <p:bold r:id="rId17"/>
+      <p:italic r:id="rId18"/>
+      <p:boldItalic r:id="rId19"/>
     </p:embeddedFont>
     <p:embeddedFont>
       <p:font typeface="Raleway" panose="020B0604020202020204" charset="0"/>
-      <p:regular r:id="rId19"/>
-      <p:bold r:id="rId20"/>
-      <p:italic r:id="rId21"/>
-      <p:boldItalic r:id="rId22"/>
+      <p:regular r:id="rId20"/>
+      <p:bold r:id="rId21"/>
+      <p:italic r:id="rId22"/>
+      <p:boldItalic r:id="rId23"/>
     </p:embeddedFont>
   </p:embeddedFontLst>
   <p:defaultTextStyle>
@@ -8598,7 +8599,7 @@
                 <a:latin typeface="Times New Roman" panose="02020603050405020304" pitchFamily="18" charset="0"/>
                 <a:cs typeface="Times New Roman" panose="02020603050405020304" pitchFamily="18" charset="0"/>
               </a:rPr>
-              <a:t>TU Wien</a:t>
+              <a:t>TU Wien, Austria</a:t>
             </a:r>
             <a:endParaRPr sz="2000" b="1" dirty="0">
               <a:solidFill>
@@ -8626,7 +8627,17 @@
                 <a:latin typeface="Times New Roman" panose="02020603050405020304" pitchFamily="18" charset="0"/>
                 <a:cs typeface="Times New Roman" panose="02020603050405020304" pitchFamily="18" charset="0"/>
               </a:rPr>
-              <a:t>Shuaiqun Pan,</a:t>
+              <a:t>Shuaiqun Pan, </a:t>
+            </a:r>
+            <a:r>
+              <a:rPr lang="en-US" sz="2000" b="1" dirty="0">
+                <a:solidFill>
+                  <a:schemeClr val="bg2"/>
+                </a:solidFill>
+                <a:latin typeface="Times New Roman" panose="02020603050405020304" pitchFamily="18" charset="0"/>
+                <a:cs typeface="Times New Roman" panose="02020603050405020304" pitchFamily="18" charset="0"/>
+              </a:rPr>
+              <a:t>Leiden University, The Netherlands</a:t>
             </a:r>
             <a:endParaRPr sz="2000" b="1" dirty="0">
               <a:solidFill>
@@ -8792,7 +8803,7 @@
         <p:spPr>
           <a:xfrm>
             <a:off x="300572" y="2014139"/>
-            <a:ext cx="3842550" cy="2261100"/>
+            <a:ext cx="2321247" cy="2261100"/>
           </a:xfrm>
           <a:prstGeom prst="rect">
             <a:avLst/>
@@ -8800,7 +8811,7 @@
         </p:spPr>
         <p:txBody>
           <a:bodyPr spcFirstLastPara="1" wrap="square" lIns="91425" tIns="91425" rIns="91425" bIns="91425" anchor="t" anchorCtr="0">
-            <a:normAutofit/>
+            <a:normAutofit fontScale="92500" lnSpcReduction="10000"/>
           </a:bodyPr>
           <a:lstStyle/>
           <a:p>
@@ -8814,25 +8825,70 @@
               <a:buNone/>
             </a:pPr>
             <a:r>
-              <a:rPr lang="en-US" dirty="0"/>
-              <a:t>Adding nodes to a</a:t>
+              <a:rPr lang="en-US" dirty="0">
+                <a:latin typeface="Times New Roman" panose="02020603050405020304" pitchFamily="18" charset="0"/>
+                <a:cs typeface="Times New Roman" panose="02020603050405020304" pitchFamily="18" charset="0"/>
+              </a:rPr>
+              <a:t>Adding nodes to a community:</a:t>
             </a:r>
           </a:p>
           <a:p>
-            <a:pPr marL="0" lvl="0" indent="0" algn="l" rtl="0">
+            <a:pPr marL="342900" lvl="0" indent="-342900" algn="l" rtl="0">
               <a:spcBef>
                 <a:spcPts val="0"/>
               </a:spcBef>
               <a:spcAft>
                 <a:spcPts val="1200"/>
               </a:spcAft>
-              <a:buNone/>
+              <a:buAutoNum type="arabicPeriod"/>
             </a:pPr>
             <a:r>
-              <a:rPr lang="en-US" dirty="0"/>
-              <a:t> community</a:t>
+              <a:rPr lang="en-US" dirty="0">
+                <a:latin typeface="Times New Roman" panose="02020603050405020304" pitchFamily="18" charset="0"/>
+                <a:cs typeface="Times New Roman" panose="02020603050405020304" pitchFamily="18" charset="0"/>
+              </a:rPr>
+              <a:t>Check community index</a:t>
             </a:r>
-            <a:endParaRPr dirty="0"/>
+          </a:p>
+          <a:p>
+            <a:pPr marL="342900" lvl="0" indent="-342900" algn="l" rtl="0">
+              <a:spcBef>
+                <a:spcPts val="0"/>
+              </a:spcBef>
+              <a:spcAft>
+                <a:spcPts val="1200"/>
+              </a:spcAft>
+              <a:buAutoNum type="arabicPeriod"/>
+            </a:pPr>
+            <a:r>
+              <a:rPr lang="en-US" dirty="0">
+                <a:latin typeface="Times New Roman" panose="02020603050405020304" pitchFamily="18" charset="0"/>
+                <a:cs typeface="Times New Roman" panose="02020603050405020304" pitchFamily="18" charset="0"/>
+              </a:rPr>
+              <a:t>Calculate weights after adding the node to the community</a:t>
+            </a:r>
+          </a:p>
+          <a:p>
+            <a:pPr marL="342900" lvl="0" indent="-342900" algn="l" rtl="0">
+              <a:spcBef>
+                <a:spcPts val="0"/>
+              </a:spcBef>
+              <a:spcAft>
+                <a:spcPts val="1200"/>
+              </a:spcAft>
+              <a:buAutoNum type="arabicPeriod"/>
+            </a:pPr>
+            <a:r>
+              <a:rPr lang="en-US" dirty="0">
+                <a:latin typeface="Times New Roman" panose="02020603050405020304" pitchFamily="18" charset="0"/>
+                <a:cs typeface="Times New Roman" panose="02020603050405020304" pitchFamily="18" charset="0"/>
+              </a:rPr>
+              <a:t>Decision to add the node to the community</a:t>
+            </a:r>
+            <a:endParaRPr dirty="0">
+              <a:latin typeface="Times New Roman" panose="02020603050405020304" pitchFamily="18" charset="0"/>
+              <a:cs typeface="Times New Roman" panose="02020603050405020304" pitchFamily="18" charset="0"/>
+            </a:endParaRPr>
           </a:p>
         </p:txBody>
       </p:sp>
@@ -8858,7 +8914,7 @@
         </p:blipFill>
         <p:spPr>
           <a:xfrm>
-            <a:off x="2613758" y="1853850"/>
+            <a:off x="2840335" y="1832251"/>
             <a:ext cx="6229670" cy="2914800"/>
           </a:xfrm>
           <a:prstGeom prst="rect">
@@ -8977,10 +9033,16 @@
               <a:buNone/>
             </a:pPr>
             <a:r>
-              <a:rPr lang="en-US" dirty="0"/>
+              <a:rPr lang="en-US" dirty="0">
+                <a:latin typeface="Times New Roman" panose="02020603050405020304" pitchFamily="18" charset="0"/>
+                <a:cs typeface="Times New Roman" panose="02020603050405020304" pitchFamily="18" charset="0"/>
+              </a:rPr>
               <a:t>Lower bound</a:t>
             </a:r>
-            <a:endParaRPr dirty="0"/>
+            <a:endParaRPr dirty="0">
+              <a:latin typeface="Times New Roman" panose="02020603050405020304" pitchFamily="18" charset="0"/>
+              <a:cs typeface="Times New Roman" panose="02020603050405020304" pitchFamily="18" charset="0"/>
+            </a:endParaRPr>
           </a:p>
         </p:txBody>
       </p:sp>
@@ -9121,10 +9183,16 @@
               <a:buNone/>
             </a:pPr>
             <a:r>
-              <a:rPr lang="en"/>
+              <a:rPr lang="en" dirty="0">
+                <a:latin typeface="Times New Roman" panose="02020603050405020304" pitchFamily="18" charset="0"/>
+                <a:cs typeface="Times New Roman" panose="02020603050405020304" pitchFamily="18" charset="0"/>
+              </a:rPr>
               <a:t>For any selected node:</a:t>
             </a:r>
-            <a:endParaRPr/>
+            <a:endParaRPr dirty="0">
+              <a:latin typeface="Times New Roman" panose="02020603050405020304" pitchFamily="18" charset="0"/>
+              <a:cs typeface="Times New Roman" panose="02020603050405020304" pitchFamily="18" charset="0"/>
+            </a:endParaRPr>
           </a:p>
           <a:p>
             <a:pPr marL="457200" lvl="0" indent="-311150" algn="l" rtl="0">
@@ -9138,10 +9206,16 @@
               <a:buChar char="●"/>
             </a:pPr>
             <a:r>
-              <a:rPr lang="en"/>
+              <a:rPr lang="en" dirty="0">
+                <a:latin typeface="Times New Roman" panose="02020603050405020304" pitchFamily="18" charset="0"/>
+                <a:cs typeface="Times New Roman" panose="02020603050405020304" pitchFamily="18" charset="0"/>
+              </a:rPr>
               <a:t>Replace the node in a randomly selected community</a:t>
             </a:r>
-            <a:endParaRPr/>
+            <a:endParaRPr dirty="0">
+              <a:latin typeface="Times New Roman" panose="02020603050405020304" pitchFamily="18" charset="0"/>
+              <a:cs typeface="Times New Roman" panose="02020603050405020304" pitchFamily="18" charset="0"/>
+            </a:endParaRPr>
           </a:p>
           <a:p>
             <a:pPr marL="457200" lvl="0" indent="-311150" algn="l" rtl="0">
@@ -9155,10 +9229,16 @@
               <a:buChar char="●"/>
             </a:pPr>
             <a:r>
-              <a:rPr lang="en"/>
+              <a:rPr lang="en" dirty="0">
+                <a:latin typeface="Times New Roman" panose="02020603050405020304" pitchFamily="18" charset="0"/>
+                <a:cs typeface="Times New Roman" panose="02020603050405020304" pitchFamily="18" charset="0"/>
+              </a:rPr>
               <a:t>Replace the node in a empty community (if that is not already the case)</a:t>
             </a:r>
-            <a:endParaRPr/>
+            <a:endParaRPr dirty="0">
+              <a:latin typeface="Times New Roman" panose="02020603050405020304" pitchFamily="18" charset="0"/>
+              <a:cs typeface="Times New Roman" panose="02020603050405020304" pitchFamily="18" charset="0"/>
+            </a:endParaRPr>
           </a:p>
           <a:p>
             <a:pPr marL="457200" lvl="0" indent="-311150" algn="l" rtl="0">
@@ -9172,10 +9252,16 @@
               <a:buChar char="●"/>
             </a:pPr>
             <a:r>
-              <a:rPr lang="en"/>
+              <a:rPr lang="en" dirty="0">
+                <a:latin typeface="Times New Roman" panose="02020603050405020304" pitchFamily="18" charset="0"/>
+                <a:cs typeface="Times New Roman" panose="02020603050405020304" pitchFamily="18" charset="0"/>
+              </a:rPr>
               <a:t>Replace the node in the community that bring the most improvement</a:t>
             </a:r>
-            <a:endParaRPr/>
+            <a:endParaRPr dirty="0">
+              <a:latin typeface="Times New Roman" panose="02020603050405020304" pitchFamily="18" charset="0"/>
+              <a:cs typeface="Times New Roman" panose="02020603050405020304" pitchFamily="18" charset="0"/>
+            </a:endParaRPr>
           </a:p>
           <a:p>
             <a:pPr marL="0" lvl="0" indent="0" algn="l" rtl="0">
@@ -9187,11 +9273,155 @@
               </a:spcAft>
               <a:buNone/>
             </a:pPr>
-            <a:endParaRPr/>
+            <a:endParaRPr dirty="0">
+              <a:latin typeface="Times New Roman" panose="02020603050405020304" pitchFamily="18" charset="0"/>
+              <a:cs typeface="Times New Roman" panose="02020603050405020304" pitchFamily="18" charset="0"/>
+            </a:endParaRPr>
           </a:p>
         </p:txBody>
       </p:sp>
     </p:spTree>
+  </p:cSld>
+  <p:clrMapOvr>
+    <a:masterClrMapping/>
+  </p:clrMapOvr>
+</p:sld>
+</file>
+
+<file path=ppt/slides/slide13.xml><?xml version="1.0" encoding="utf-8"?>
+<p:sld xmlns:a="http://schemas.openxmlformats.org/drawingml/2006/main" xmlns:r="http://schemas.openxmlformats.org/officeDocument/2006/relationships" xmlns:p="http://schemas.openxmlformats.org/presentationml/2006/main">
+  <p:cSld>
+    <p:spTree>
+      <p:nvGrpSpPr>
+        <p:cNvPr id="1" name=""/>
+        <p:cNvGrpSpPr/>
+        <p:nvPr/>
+      </p:nvGrpSpPr>
+      <p:grpSpPr>
+        <a:xfrm>
+          <a:off x="0" y="0"/>
+          <a:ext cx="0" cy="0"/>
+          <a:chOff x="0" y="0"/>
+          <a:chExt cx="0" cy="0"/>
+        </a:xfrm>
+      </p:grpSpPr>
+      <p:sp>
+        <p:nvSpPr>
+          <p:cNvPr id="2" name="Title 1">
+            <a:extLst>
+              <a:ext uri="{FF2B5EF4-FFF2-40B4-BE49-F238E27FC236}">
+                <a16:creationId xmlns:a16="http://schemas.microsoft.com/office/drawing/2014/main" id="{693F00F7-A23A-4856-8311-9C66F9C7C702}"/>
+              </a:ext>
+            </a:extLst>
+          </p:cNvPr>
+          <p:cNvSpPr>
+            <a:spLocks noGrp="1"/>
+          </p:cNvSpPr>
+          <p:nvPr>
+            <p:ph type="title"/>
+          </p:nvPr>
+        </p:nvSpPr>
+        <p:spPr/>
+        <p:txBody>
+          <a:bodyPr>
+            <a:normAutofit fontScale="90000"/>
+          </a:bodyPr>
+          <a:lstStyle/>
+          <a:p>
+            <a:r>
+              <a:rPr lang="en-US" dirty="0"/>
+              <a:t>Future Work</a:t>
+            </a:r>
+          </a:p>
+        </p:txBody>
+      </p:sp>
+      <p:sp>
+        <p:nvSpPr>
+          <p:cNvPr id="3" name="Text Placeholder 2">
+            <a:extLst>
+              <a:ext uri="{FF2B5EF4-FFF2-40B4-BE49-F238E27FC236}">
+                <a16:creationId xmlns:a16="http://schemas.microsoft.com/office/drawing/2014/main" id="{71E88063-342E-49AD-A349-078FE168EAC3}"/>
+              </a:ext>
+            </a:extLst>
+          </p:cNvPr>
+          <p:cNvSpPr>
+            <a:spLocks noGrp="1"/>
+          </p:cNvSpPr>
+          <p:nvPr>
+            <p:ph type="body" idx="1"/>
+          </p:nvPr>
+        </p:nvSpPr>
+        <p:spPr/>
+        <p:txBody>
+          <a:bodyPr/>
+          <a:lstStyle/>
+          <a:p>
+            <a:r>
+              <a:rPr lang="en-US" dirty="0">
+                <a:latin typeface="Times New Roman" panose="02020603050405020304" pitchFamily="18" charset="0"/>
+                <a:cs typeface="Times New Roman" panose="02020603050405020304" pitchFamily="18" charset="0"/>
+              </a:rPr>
+              <a:t>Implementing local search specific functions</a:t>
+            </a:r>
+          </a:p>
+          <a:p>
+            <a:r>
+              <a:rPr lang="en-US" dirty="0">
+                <a:latin typeface="Times New Roman" panose="02020603050405020304" pitchFamily="18" charset="0"/>
+                <a:cs typeface="Times New Roman" panose="02020603050405020304" pitchFamily="18" charset="0"/>
+              </a:rPr>
+              <a:t>Comparing both the methods – which one is better?</a:t>
+            </a:r>
+          </a:p>
+          <a:p>
+            <a:r>
+              <a:rPr lang="en-US" dirty="0">
+                <a:latin typeface="Times New Roman" panose="02020603050405020304" pitchFamily="18" charset="0"/>
+                <a:cs typeface="Times New Roman" panose="02020603050405020304" pitchFamily="18" charset="0"/>
+              </a:rPr>
+              <a:t>Looking at hybrid method (local + constructive) – Is it any better? Advantages</a:t>
+            </a:r>
+            <a:r>
+              <a:rPr lang="en-US">
+                <a:latin typeface="Times New Roman" panose="02020603050405020304" pitchFamily="18" charset="0"/>
+                <a:cs typeface="Times New Roman" panose="02020603050405020304" pitchFamily="18" charset="0"/>
+              </a:rPr>
+              <a:t>/Disadvantages!</a:t>
+            </a:r>
+            <a:endParaRPr lang="en-US" dirty="0">
+              <a:latin typeface="Times New Roman" panose="02020603050405020304" pitchFamily="18" charset="0"/>
+              <a:cs typeface="Times New Roman" panose="02020603050405020304" pitchFamily="18" charset="0"/>
+            </a:endParaRPr>
+          </a:p>
+          <a:p>
+            <a:r>
+              <a:rPr lang="en-US" dirty="0">
+                <a:latin typeface="Times New Roman" panose="02020603050405020304" pitchFamily="18" charset="0"/>
+                <a:cs typeface="Times New Roman" panose="02020603050405020304" pitchFamily="18" charset="0"/>
+              </a:rPr>
+              <a:t>Please feel free to ask any questions/ suggest improvements </a:t>
+            </a:r>
+            <a:r>
+              <a:rPr lang="en-US" dirty="0">
+                <a:latin typeface="Times New Roman" panose="02020603050405020304" pitchFamily="18" charset="0"/>
+                <a:cs typeface="Times New Roman" panose="02020603050405020304" pitchFamily="18" charset="0"/>
+                <a:sym typeface="Wingdings" panose="05000000000000000000" pitchFamily="2" charset="2"/>
+              </a:rPr>
+              <a:t></a:t>
+            </a:r>
+            <a:endParaRPr lang="en-US" dirty="0">
+              <a:latin typeface="Times New Roman" panose="02020603050405020304" pitchFamily="18" charset="0"/>
+              <a:cs typeface="Times New Roman" panose="02020603050405020304" pitchFamily="18" charset="0"/>
+            </a:endParaRPr>
+          </a:p>
+        </p:txBody>
+      </p:sp>
+    </p:spTree>
+    <p:extLst>
+      <p:ext uri="{BB962C8B-B14F-4D97-AF65-F5344CB8AC3E}">
+        <p14:creationId xmlns:p14="http://schemas.microsoft.com/office/powerpoint/2010/main" val="1788009809"/>
+      </p:ext>
+    </p:extLst>
   </p:cSld>
   <p:clrMapOvr>
     <a:masterClrMapping/>
@@ -9701,7 +9931,7 @@
                 <a:latin typeface="Times New Roman" panose="02020603050405020304" pitchFamily="18" charset="0"/>
                 <a:cs typeface="Times New Roman" panose="02020603050405020304" pitchFamily="18" charset="0"/>
               </a:rPr>
-              <a:t>Can be classified as a  Combinatorial problem </a:t>
+              <a:t>Can be classified as a Combinatorial problem </a:t>
             </a:r>
           </a:p>
           <a:p>
@@ -9778,15 +10008,14 @@
             </a:r>
           </a:p>
           <a:p>
-            <a:pPr marL="171450" lvl="0" indent="-171450" algn="l" rtl="0">
+            <a:pPr marL="0" lvl="0" indent="0" algn="l" rtl="0">
               <a:spcBef>
                 <a:spcPts val="0"/>
               </a:spcBef>
               <a:spcAft>
                 <a:spcPts val="1200"/>
               </a:spcAft>
-              <a:buFont typeface="Wingdings" panose="05000000000000000000" pitchFamily="2" charset="2"/>
-              <a:buChar char="§"/>
+              <a:buNone/>
             </a:pPr>
             <a:endParaRPr lang="en-US" sz="1200" dirty="0">
               <a:latin typeface="Times New Roman" panose="02020603050405020304" pitchFamily="18" charset="0"/>
@@ -9794,15 +10023,14 @@
             </a:endParaRPr>
           </a:p>
           <a:p>
-            <a:pPr marL="171450" lvl="0" indent="-171450" algn="l" rtl="0">
+            <a:pPr marL="0" lvl="0" indent="0" algn="l" rtl="0">
               <a:spcBef>
                 <a:spcPts val="0"/>
               </a:spcBef>
               <a:spcAft>
                 <a:spcPts val="1200"/>
               </a:spcAft>
-              <a:buFont typeface="Wingdings" panose="05000000000000000000" pitchFamily="2" charset="2"/>
-              <a:buChar char="§"/>
+              <a:buNone/>
             </a:pPr>
             <a:endParaRPr lang="en-US" sz="1200" dirty="0">
               <a:latin typeface="Times New Roman" panose="02020603050405020304" pitchFamily="18" charset="0"/>
@@ -9856,7 +10084,7 @@
         </p:blipFill>
         <p:spPr>
           <a:xfrm>
-            <a:off x="2022652" y="2775938"/>
+            <a:off x="1611355" y="2700901"/>
             <a:ext cx="890209" cy="823996"/>
           </a:xfrm>
           <a:prstGeom prst="rect">
@@ -9886,14 +10114,88 @@
         </p:blipFill>
         <p:spPr>
           <a:xfrm>
-            <a:off x="2022652" y="3663896"/>
-            <a:ext cx="811547" cy="690421"/>
+            <a:off x="1682786" y="3588859"/>
+            <a:ext cx="756131" cy="643276"/>
           </a:xfrm>
           <a:prstGeom prst="rect">
             <a:avLst/>
           </a:prstGeom>
         </p:spPr>
       </p:pic>
+      <p:pic>
+        <p:nvPicPr>
+          <p:cNvPr id="4" name="Picture 3">
+            <a:extLst>
+              <a:ext uri="{FF2B5EF4-FFF2-40B4-BE49-F238E27FC236}">
+                <a16:creationId xmlns:a16="http://schemas.microsoft.com/office/drawing/2014/main" id="{7581537F-C9D6-4FBC-9ADF-F147F855DE21}"/>
+              </a:ext>
+            </a:extLst>
+          </p:cNvPr>
+          <p:cNvPicPr>
+            <a:picLocks noChangeAspect="1"/>
+          </p:cNvPicPr>
+          <p:nvPr/>
+        </p:nvPicPr>
+        <p:blipFill>
+          <a:blip r:embed="rId5"/>
+          <a:stretch>
+            <a:fillRect/>
+          </a:stretch>
+        </p:blipFill>
+        <p:spPr>
+          <a:xfrm>
+            <a:off x="4979536" y="2571750"/>
+            <a:ext cx="1854295" cy="806491"/>
+          </a:xfrm>
+          <a:prstGeom prst="rect">
+            <a:avLst/>
+          </a:prstGeom>
+        </p:spPr>
+      </p:pic>
+      <p:sp>
+        <p:nvSpPr>
+          <p:cNvPr id="5" name="Rectangle 4">
+            <a:extLst>
+              <a:ext uri="{FF2B5EF4-FFF2-40B4-BE49-F238E27FC236}">
+                <a16:creationId xmlns:a16="http://schemas.microsoft.com/office/drawing/2014/main" id="{B176DE03-D282-4100-9BDB-E59B67C878B9}"/>
+              </a:ext>
+            </a:extLst>
+          </p:cNvPr>
+          <p:cNvSpPr/>
+          <p:nvPr/>
+        </p:nvSpPr>
+        <p:spPr>
+          <a:xfrm>
+            <a:off x="3534425" y="2700901"/>
+            <a:ext cx="1593706" cy="276999"/>
+          </a:xfrm>
+          <a:prstGeom prst="rect">
+            <a:avLst/>
+          </a:prstGeom>
+        </p:spPr>
+        <p:txBody>
+          <a:bodyPr wrap="none">
+            <a:spAutoFit/>
+          </a:bodyPr>
+          <a:lstStyle/>
+          <a:p>
+            <a:pPr marL="171450" lvl="0" indent="-171450">
+              <a:spcAft>
+                <a:spcPts val="1200"/>
+              </a:spcAft>
+              <a:buFont typeface="Wingdings" panose="05000000000000000000" pitchFamily="2" charset="2"/>
+              <a:buChar char="§"/>
+            </a:pPr>
+            <a:r>
+              <a:rPr lang="en-US" sz="1200" dirty="0">
+                <a:latin typeface="Times New Roman" panose="02020603050405020304" pitchFamily="18" charset="0"/>
+                <a:cs typeface="Times New Roman" panose="02020603050405020304" pitchFamily="18" charset="0"/>
+              </a:rPr>
+              <a:t>Objective function: </a:t>
+            </a:r>
+          </a:p>
+        </p:txBody>
+      </p:sp>
     </p:spTree>
     <p:extLst>
       <p:ext uri="{BB962C8B-B14F-4D97-AF65-F5344CB8AC3E}">
@@ -10140,7 +10442,7 @@
         </p:spPr>
         <p:txBody>
           <a:bodyPr spcFirstLastPara="1" wrap="square" lIns="91425" tIns="91425" rIns="91425" bIns="91425" anchor="t" anchorCtr="0">
-            <a:normAutofit fontScale="77500" lnSpcReduction="20000"/>
+            <a:noAutofit/>
           </a:bodyPr>
           <a:lstStyle/>
           <a:p>
@@ -10155,7 +10457,10 @@
               <a:buChar char="§"/>
             </a:pPr>
             <a:r>
-              <a:rPr lang="en-US" dirty="0"/>
+              <a:rPr lang="en-US" sz="1200" dirty="0">
+                <a:latin typeface="Times New Roman" panose="02020603050405020304" pitchFamily="18" charset="0"/>
+                <a:cs typeface="Times New Roman" panose="02020603050405020304" pitchFamily="18" charset="0"/>
+              </a:rPr>
               <a:t>Component comprises:</a:t>
             </a:r>
           </a:p>
@@ -10168,7 +10473,10 @@
               <a:buAutoNum type="arabicPeriod"/>
             </a:pPr>
             <a:r>
-              <a:rPr lang="en-US" dirty="0"/>
+              <a:rPr lang="en-US" sz="1200" dirty="0">
+                <a:latin typeface="Times New Roman" panose="02020603050405020304" pitchFamily="18" charset="0"/>
+                <a:cs typeface="Times New Roman" panose="02020603050405020304" pitchFamily="18" charset="0"/>
+              </a:rPr>
               <a:t>vertex number</a:t>
             </a:r>
           </a:p>
@@ -10181,10 +10489,16 @@
               <a:buAutoNum type="arabicPeriod"/>
             </a:pPr>
             <a:r>
-              <a:rPr lang="en-US" dirty="0"/>
+              <a:rPr lang="en-US" sz="1200" dirty="0">
+                <a:latin typeface="Times New Roman" panose="02020603050405020304" pitchFamily="18" charset="0"/>
+                <a:cs typeface="Times New Roman" panose="02020603050405020304" pitchFamily="18" charset="0"/>
+              </a:rPr>
               <a:t>index of the community </a:t>
             </a:r>
-            <a:endParaRPr dirty="0"/>
+            <a:endParaRPr sz="1200" dirty="0">
+              <a:latin typeface="Times New Roman" panose="02020603050405020304" pitchFamily="18" charset="0"/>
+              <a:cs typeface="Times New Roman" panose="02020603050405020304" pitchFamily="18" charset="0"/>
+            </a:endParaRPr>
           </a:p>
         </p:txBody>
       </p:sp>
@@ -10283,44 +10597,6 @@
           </a:p>
         </p:txBody>
       </p:sp>
-      <p:sp>
-        <p:nvSpPr>
-          <p:cNvPr id="114" name="Google Shape;114;p17"/>
-          <p:cNvSpPr txBox="1">
-            <a:spLocks noGrp="1"/>
-          </p:cNvSpPr>
-          <p:nvPr>
-            <p:ph type="body" idx="1"/>
-          </p:nvPr>
-        </p:nvSpPr>
-        <p:spPr>
-          <a:xfrm>
-            <a:off x="729450" y="2078875"/>
-            <a:ext cx="7688700" cy="2261100"/>
-          </a:xfrm>
-          <a:prstGeom prst="rect">
-            <a:avLst/>
-          </a:prstGeom>
-        </p:spPr>
-        <p:txBody>
-          <a:bodyPr spcFirstLastPara="1" wrap="square" lIns="91425" tIns="91425" rIns="91425" bIns="91425" anchor="t" anchorCtr="0">
-            <a:normAutofit/>
-          </a:bodyPr>
-          <a:lstStyle/>
-          <a:p>
-            <a:pPr marL="0" lvl="0" indent="0" algn="l" rtl="0">
-              <a:spcBef>
-                <a:spcPts val="0"/>
-              </a:spcBef>
-              <a:spcAft>
-                <a:spcPts val="1200"/>
-              </a:spcAft>
-              <a:buNone/>
-            </a:pPr>
-            <a:endParaRPr b="1" dirty="0"/>
-          </a:p>
-        </p:txBody>
-      </p:sp>
       <p:pic>
         <p:nvPicPr>
           <p:cNvPr id="115" name="Google Shape;115;p17"/>
@@ -10337,7 +10613,7 @@
         </p:blipFill>
         <p:spPr>
           <a:xfrm>
-            <a:off x="1193676" y="1853851"/>
+            <a:off x="1140010" y="1999508"/>
             <a:ext cx="6863979" cy="2213200"/>
           </a:xfrm>
           <a:prstGeom prst="rect">
@@ -10455,7 +10731,10 @@
               <a:buNone/>
             </a:pPr>
             <a:r>
-              <a:rPr lang="en-US" dirty="0"/>
+              <a:rPr lang="en-US" dirty="0">
+                <a:latin typeface="Times New Roman" panose="02020603050405020304" pitchFamily="18" charset="0"/>
+                <a:cs typeface="Times New Roman" panose="02020603050405020304" pitchFamily="18" charset="0"/>
+              </a:rPr>
               <a:t>A solution is considered feasible if it satisfies the following conditions:</a:t>
             </a:r>
           </a:p>
@@ -10470,7 +10749,10 @@
               <a:buAutoNum type="arabicPeriod"/>
             </a:pPr>
             <a:r>
-              <a:rPr lang="en-US" dirty="0"/>
+              <a:rPr lang="en-US" dirty="0">
+                <a:latin typeface="Times New Roman" panose="02020603050405020304" pitchFamily="18" charset="0"/>
+                <a:cs typeface="Times New Roman" panose="02020603050405020304" pitchFamily="18" charset="0"/>
+              </a:rPr>
               <a:t>Union of all communities must be equal to the total nodes</a:t>
             </a:r>
           </a:p>
@@ -10485,7 +10767,10 @@
               <a:buAutoNum type="arabicPeriod"/>
             </a:pPr>
             <a:r>
-              <a:rPr lang="en-US" dirty="0"/>
+              <a:rPr lang="en-US" dirty="0">
+                <a:latin typeface="Times New Roman" panose="02020603050405020304" pitchFamily="18" charset="0"/>
+                <a:cs typeface="Times New Roman" panose="02020603050405020304" pitchFamily="18" charset="0"/>
+              </a:rPr>
               <a:t>Communities should be disjoint sets</a:t>
             </a:r>
           </a:p>
@@ -10627,10 +10912,16 @@
               <a:buNone/>
             </a:pPr>
             <a:r>
-              <a:rPr lang="en-US" dirty="0"/>
+              <a:rPr lang="en-US" sz="1400" dirty="0">
+                <a:latin typeface="Times New Roman" panose="02020603050405020304" pitchFamily="18" charset="0"/>
+                <a:cs typeface="Times New Roman" panose="02020603050405020304" pitchFamily="18" charset="0"/>
+              </a:rPr>
               <a:t>Adding moves </a:t>
             </a:r>
-            <a:endParaRPr dirty="0"/>
+            <a:endParaRPr sz="1400" dirty="0">
+              <a:latin typeface="Times New Roman" panose="02020603050405020304" pitchFamily="18" charset="0"/>
+              <a:cs typeface="Times New Roman" panose="02020603050405020304" pitchFamily="18" charset="0"/>
+            </a:endParaRPr>
           </a:p>
         </p:txBody>
       </p:sp>
@@ -10656,7 +10947,7 @@
         </p:blipFill>
         <p:spPr>
           <a:xfrm>
-            <a:off x="725850" y="2714946"/>
+            <a:off x="725850" y="2634720"/>
             <a:ext cx="7817252" cy="1149409"/>
           </a:xfrm>
           <a:prstGeom prst="rect">

</xml_diff>